<commit_message>
Update for Columbia 17/12/2024
</commit_message>
<xml_diff>
--- a/master_files/materials/03_Sampling.pptx
+++ b/master_files/materials/03_Sampling.pptx
@@ -32,7 +32,7 @@
     <p:sldId id="1099" r:id="rId26"/>
     <p:sldId id="1097" r:id="rId27"/>
     <p:sldId id="1107" r:id="rId28"/>
-    <p:sldId id="1108" r:id="rId29"/>
+    <p:sldId id="1109" r:id="rId29"/>
     <p:sldId id="1079" r:id="rId30"/>
     <p:sldId id="1101" r:id="rId31"/>
   </p:sldIdLst>
@@ -234,7 +234,7 @@
           <a:p>
             <a:fld id="{E033252C-ECEF-0044-BF19-FBFB46CE84A2}" type="datetimeFigureOut">
               <a:rPr lang="en-US" smtClean="0"/>
-              <a:t>10/26/24</a:t>
+              <a:t>12/16/24</a:t>
             </a:fld>
             <a:endParaRPr lang="en-US"/>
           </a:p>
@@ -732,7 +732,7 @@
           <a:p>
             <a:fld id="{6A8FB48A-BFC4-2846-8228-6201ABA4D0C5}" type="datetimeFigureOut">
               <a:rPr lang="en-US" smtClean="0"/>
-              <a:t>10/26/24</a:t>
+              <a:t>12/16/24</a:t>
             </a:fld>
             <a:endParaRPr lang="en-US"/>
           </a:p>
@@ -930,7 +930,7 @@
           <a:p>
             <a:fld id="{6A8FB48A-BFC4-2846-8228-6201ABA4D0C5}" type="datetimeFigureOut">
               <a:rPr lang="en-US" smtClean="0"/>
-              <a:t>10/26/24</a:t>
+              <a:t>12/16/24</a:t>
             </a:fld>
             <a:endParaRPr lang="en-US"/>
           </a:p>
@@ -1138,7 +1138,7 @@
           <a:p>
             <a:fld id="{6A8FB48A-BFC4-2846-8228-6201ABA4D0C5}" type="datetimeFigureOut">
               <a:rPr lang="en-US" smtClean="0"/>
-              <a:t>10/26/24</a:t>
+              <a:t>12/16/24</a:t>
             </a:fld>
             <a:endParaRPr lang="en-US"/>
           </a:p>
@@ -1336,7 +1336,7 @@
           <a:p>
             <a:fld id="{6A8FB48A-BFC4-2846-8228-6201ABA4D0C5}" type="datetimeFigureOut">
               <a:rPr lang="en-US" smtClean="0"/>
-              <a:t>10/26/24</a:t>
+              <a:t>12/16/24</a:t>
             </a:fld>
             <a:endParaRPr lang="en-US"/>
           </a:p>
@@ -1611,7 +1611,7 @@
           <a:p>
             <a:fld id="{6A8FB48A-BFC4-2846-8228-6201ABA4D0C5}" type="datetimeFigureOut">
               <a:rPr lang="en-US" smtClean="0"/>
-              <a:t>10/26/24</a:t>
+              <a:t>12/16/24</a:t>
             </a:fld>
             <a:endParaRPr lang="en-US"/>
           </a:p>
@@ -1876,7 +1876,7 @@
           <a:p>
             <a:fld id="{6A8FB48A-BFC4-2846-8228-6201ABA4D0C5}" type="datetimeFigureOut">
               <a:rPr lang="en-US" smtClean="0"/>
-              <a:t>10/26/24</a:t>
+              <a:t>12/16/24</a:t>
             </a:fld>
             <a:endParaRPr lang="en-US"/>
           </a:p>
@@ -2288,7 +2288,7 @@
           <a:p>
             <a:fld id="{6A8FB48A-BFC4-2846-8228-6201ABA4D0C5}" type="datetimeFigureOut">
               <a:rPr lang="en-US" smtClean="0"/>
-              <a:t>10/26/24</a:t>
+              <a:t>12/16/24</a:t>
             </a:fld>
             <a:endParaRPr lang="en-US"/>
           </a:p>
@@ -2429,7 +2429,7 @@
           <a:p>
             <a:fld id="{6A8FB48A-BFC4-2846-8228-6201ABA4D0C5}" type="datetimeFigureOut">
               <a:rPr lang="en-US" smtClean="0"/>
-              <a:t>10/26/24</a:t>
+              <a:t>12/16/24</a:t>
             </a:fld>
             <a:endParaRPr lang="en-US"/>
           </a:p>
@@ -2542,7 +2542,7 @@
           <a:p>
             <a:fld id="{6A8FB48A-BFC4-2846-8228-6201ABA4D0C5}" type="datetimeFigureOut">
               <a:rPr lang="en-US" smtClean="0"/>
-              <a:t>10/26/24</a:t>
+              <a:t>12/16/24</a:t>
             </a:fld>
             <a:endParaRPr lang="en-US"/>
           </a:p>
@@ -2853,7 +2853,7 @@
           <a:p>
             <a:fld id="{6A8FB48A-BFC4-2846-8228-6201ABA4D0C5}" type="datetimeFigureOut">
               <a:rPr lang="en-US" smtClean="0"/>
-              <a:t>10/26/24</a:t>
+              <a:t>12/16/24</a:t>
             </a:fld>
             <a:endParaRPr lang="en-US"/>
           </a:p>
@@ -3141,7 +3141,7 @@
           <a:p>
             <a:fld id="{6A8FB48A-BFC4-2846-8228-6201ABA4D0C5}" type="datetimeFigureOut">
               <a:rPr lang="en-US" smtClean="0"/>
-              <a:t>10/26/24</a:t>
+              <a:t>12/16/24</a:t>
             </a:fld>
             <a:endParaRPr lang="en-US"/>
           </a:p>
@@ -3382,7 +3382,7 @@
           <a:p>
             <a:fld id="{6A8FB48A-BFC4-2846-8228-6201ABA4D0C5}" type="datetimeFigureOut">
               <a:rPr lang="en-US" smtClean="0"/>
-              <a:t>10/26/24</a:t>
+              <a:t>12/16/24</a:t>
             </a:fld>
             <a:endParaRPr lang="en-US"/>
           </a:p>
@@ -14290,7 +14290,7 @@
         </p:blipFill>
         <p:spPr>
           <a:xfrm>
-            <a:off x="539576" y="1812547"/>
+            <a:off x="624636" y="1025943"/>
             <a:ext cx="5770607" cy="1573208"/>
           </a:xfrm>
           <a:prstGeom prst="rect">
@@ -14320,7 +14320,7 @@
         </p:blipFill>
         <p:spPr>
           <a:xfrm>
-            <a:off x="7440886" y="3996536"/>
+            <a:off x="7144973" y="5088442"/>
             <a:ext cx="1361476" cy="1778702"/>
           </a:xfrm>
           <a:prstGeom prst="rect">
@@ -14350,8 +14350,8 @@
         </p:blipFill>
         <p:spPr>
           <a:xfrm>
-            <a:off x="539576" y="3472245"/>
-            <a:ext cx="5663516" cy="2827284"/>
+            <a:off x="624636" y="4537117"/>
+            <a:ext cx="4649112" cy="2320883"/>
           </a:xfrm>
           <a:prstGeom prst="rect">
             <a:avLst/>
@@ -14380,7 +14380,7 @@
         </p:blipFill>
         <p:spPr>
           <a:xfrm>
-            <a:off x="7357624" y="1918413"/>
+            <a:off x="7144973" y="880207"/>
             <a:ext cx="1361476" cy="1361476"/>
           </a:xfrm>
           <a:prstGeom prst="rect">
@@ -14404,7 +14404,12 @@
             <p:ph type="title"/>
           </p:nvPr>
         </p:nvSpPr>
-        <p:spPr/>
+        <p:spPr>
+          <a:xfrm>
+            <a:off x="838200" y="1"/>
+            <a:ext cx="10515600" cy="765544"/>
+          </a:xfrm>
+        </p:spPr>
         <p:txBody>
           <a:bodyPr/>
           <a:lstStyle/>
@@ -14416,10 +14421,70 @@
           </a:p>
         </p:txBody>
       </p:sp>
+      <p:pic>
+        <p:nvPicPr>
+          <p:cNvPr id="2" name="Picture 1">
+            <a:extLst>
+              <a:ext uri="{FF2B5EF4-FFF2-40B4-BE49-F238E27FC236}">
+                <a16:creationId xmlns:a16="http://schemas.microsoft.com/office/drawing/2014/main" id="{F2802A6C-56A7-6261-94F1-D47E32612ABD}"/>
+              </a:ext>
+            </a:extLst>
+          </p:cNvPr>
+          <p:cNvPicPr>
+            <a:picLocks noChangeAspect="1"/>
+          </p:cNvPicPr>
+          <p:nvPr/>
+        </p:nvPicPr>
+        <p:blipFill>
+          <a:blip r:embed="rId6"/>
+          <a:stretch>
+            <a:fillRect/>
+          </a:stretch>
+        </p:blipFill>
+        <p:spPr>
+          <a:xfrm>
+            <a:off x="624636" y="2767760"/>
+            <a:ext cx="5318964" cy="1491090"/>
+          </a:xfrm>
+          <a:prstGeom prst="rect">
+            <a:avLst/>
+          </a:prstGeom>
+        </p:spPr>
+      </p:pic>
+      <p:pic>
+        <p:nvPicPr>
+          <p:cNvPr id="4" name="Picture 3" descr="Qr code&#10;&#10;Description automatically generated">
+            <a:extLst>
+              <a:ext uri="{FF2B5EF4-FFF2-40B4-BE49-F238E27FC236}">
+                <a16:creationId xmlns:a16="http://schemas.microsoft.com/office/drawing/2014/main" id="{E667F61E-A8CC-E1C4-C7E4-2F8E40D88D93}"/>
+              </a:ext>
+            </a:extLst>
+          </p:cNvPr>
+          <p:cNvPicPr>
+            <a:picLocks noChangeAspect="1"/>
+          </p:cNvPicPr>
+          <p:nvPr/>
+        </p:nvPicPr>
+        <p:blipFill>
+          <a:blip r:embed="rId7"/>
+          <a:stretch>
+            <a:fillRect/>
+          </a:stretch>
+        </p:blipFill>
+        <p:spPr>
+          <a:xfrm>
+            <a:off x="7080166" y="2914945"/>
+            <a:ext cx="1491090" cy="1491090"/>
+          </a:xfrm>
+          <a:prstGeom prst="rect">
+            <a:avLst/>
+          </a:prstGeom>
+        </p:spPr>
+      </p:pic>
     </p:spTree>
     <p:extLst>
       <p:ext uri="{BB962C8B-B14F-4D97-AF65-F5344CB8AC3E}">
-        <p14:creationId xmlns:p14="http://schemas.microsoft.com/office/powerpoint/2010/main" val="166131436"/>
+        <p14:creationId xmlns:p14="http://schemas.microsoft.com/office/powerpoint/2010/main" val="2691046776"/>
       </p:ext>
     </p:extLst>
   </p:cSld>
@@ -19115,6 +19180,17 @@
 </file>
 
 <file path=customXml/item1.xml><?xml version="1.0" encoding="utf-8"?>
+<p:properties xmlns:p="http://schemas.microsoft.com/office/2006/metadata/properties" xmlns:xsi="http://www.w3.org/2001/XMLSchema-instance" xmlns:pc="http://schemas.microsoft.com/office/infopath/2007/PartnerControls">
+  <documentManagement>
+    <TaxCatchAll xmlns="b6c9d19c-b34a-4cf4-8ebf-64c63fc48083" xsi:nil="true"/>
+    <lcf76f155ced4ddcb4097134ff3c332f xmlns="33f92c16-e346-46b5-ac57-2b519ac4cf68">
+      <Terms xmlns="http://schemas.microsoft.com/office/infopath/2007/PartnerControls"/>
+    </lcf76f155ced4ddcb4097134ff3c332f>
+  </documentManagement>
+</p:properties>
+</file>
+
+<file path=customXml/item2.xml><?xml version="1.0" encoding="utf-8"?>
 <ct:contentTypeSchema xmlns:ct="http://schemas.microsoft.com/office/2006/metadata/contentType" xmlns:ma="http://schemas.microsoft.com/office/2006/metadata/properties/metaAttributes" ct:_="" ma:_="" ma:contentTypeName="Document" ma:contentTypeID="0x0101007069032936BB004A979B3FCE77DE1EB1" ma:contentTypeVersion="16" ma:contentTypeDescription="Create a new document." ma:contentTypeScope="" ma:versionID="59b39aa881a230c9f06045ed60478b88">
   <xsd:schema xmlns:xsd="http://www.w3.org/2001/XMLSchema" xmlns:xs="http://www.w3.org/2001/XMLSchema" xmlns:p="http://schemas.microsoft.com/office/2006/metadata/properties" xmlns:ns2="33f92c16-e346-46b5-ac57-2b519ac4cf68" xmlns:ns3="0efde304-9646-43d8-8eee-5b1a55ab17f1" xmlns:ns4="b6c9d19c-b34a-4cf4-8ebf-64c63fc48083" targetNamespace="http://schemas.microsoft.com/office/2006/metadata/properties" ma:root="true" ma:fieldsID="c596c03b60b8e16cee14ab235af6374a" ns2:_="" ns3:_="" ns4:_="">
     <xsd:import namespace="33f92c16-e346-46b5-ac57-2b519ac4cf68"/>
@@ -19354,17 +19430,6 @@
 </ct:contentTypeSchema>
 </file>
 
-<file path=customXml/item2.xml><?xml version="1.0" encoding="utf-8"?>
-<p:properties xmlns:p="http://schemas.microsoft.com/office/2006/metadata/properties" xmlns:xsi="http://www.w3.org/2001/XMLSchema-instance" xmlns:pc="http://schemas.microsoft.com/office/infopath/2007/PartnerControls">
-  <documentManagement>
-    <TaxCatchAll xmlns="b6c9d19c-b34a-4cf4-8ebf-64c63fc48083" xsi:nil="true"/>
-    <lcf76f155ced4ddcb4097134ff3c332f xmlns="33f92c16-e346-46b5-ac57-2b519ac4cf68">
-      <Terms xmlns="http://schemas.microsoft.com/office/infopath/2007/PartnerControls"/>
-    </lcf76f155ced4ddcb4097134ff3c332f>
-  </documentManagement>
-</p:properties>
-</file>
-
 <file path=customXml/item3.xml><?xml version="1.0" encoding="utf-8"?>
 <?mso-contentType ?>
 <FormTemplates xmlns="http://schemas.microsoft.com/sharepoint/v3/contenttype/forms">
@@ -19375,6 +19440,24 @@
 </file>
 
 <file path=customXml/itemProps1.xml><?xml version="1.0" encoding="utf-8"?>
+<ds:datastoreItem xmlns:ds="http://schemas.openxmlformats.org/officeDocument/2006/customXml" ds:itemID="{E709C047-1DE0-4980-A90A-4D5EFC165D2C}">
+  <ds:schemaRefs>
+    <ds:schemaRef ds:uri="0efde304-9646-43d8-8eee-5b1a55ab17f1"/>
+    <ds:schemaRef ds:uri="33f92c16-e346-46b5-ac57-2b519ac4cf68"/>
+    <ds:schemaRef ds:uri="b6c9d19c-b34a-4cf4-8ebf-64c63fc48083"/>
+    <ds:schemaRef ds:uri="http://purl.org/dc/dcmitype/"/>
+    <ds:schemaRef ds:uri="http://purl.org/dc/elements/1.1/"/>
+    <ds:schemaRef ds:uri="http://purl.org/dc/terms/"/>
+    <ds:schemaRef ds:uri="http://schemas.microsoft.com/office/2006/documentManagement/types"/>
+    <ds:schemaRef ds:uri="http://schemas.microsoft.com/office/2006/metadata/properties"/>
+    <ds:schemaRef ds:uri="http://schemas.microsoft.com/office/infopath/2007/PartnerControls"/>
+    <ds:schemaRef ds:uri="http://schemas.openxmlformats.org/package/2006/metadata/core-properties"/>
+    <ds:schemaRef ds:uri="http://www.w3.org/XML/1998/namespace"/>
+  </ds:schemaRefs>
+</ds:datastoreItem>
+</file>
+
+<file path=customXml/itemProps2.xml><?xml version="1.0" encoding="utf-8"?>
 <ds:datastoreItem xmlns:ds="http://schemas.openxmlformats.org/officeDocument/2006/customXml" ds:itemID="{2D7DA705-6300-4113-B183-485198D9C84E}">
   <ds:schemaRefs>
     <ds:schemaRef ds:uri="0efde304-9646-43d8-8eee-5b1a55ab17f1"/>
@@ -19394,24 +19477,6 @@
 </ds:datastoreItem>
 </file>
 
-<file path=customXml/itemProps2.xml><?xml version="1.0" encoding="utf-8"?>
-<ds:datastoreItem xmlns:ds="http://schemas.openxmlformats.org/officeDocument/2006/customXml" ds:itemID="{E709C047-1DE0-4980-A90A-4D5EFC165D2C}">
-  <ds:schemaRefs>
-    <ds:schemaRef ds:uri="0efde304-9646-43d8-8eee-5b1a55ab17f1"/>
-    <ds:schemaRef ds:uri="33f92c16-e346-46b5-ac57-2b519ac4cf68"/>
-    <ds:schemaRef ds:uri="b6c9d19c-b34a-4cf4-8ebf-64c63fc48083"/>
-    <ds:schemaRef ds:uri="http://purl.org/dc/dcmitype/"/>
-    <ds:schemaRef ds:uri="http://purl.org/dc/elements/1.1/"/>
-    <ds:schemaRef ds:uri="http://purl.org/dc/terms/"/>
-    <ds:schemaRef ds:uri="http://schemas.microsoft.com/office/2006/documentManagement/types"/>
-    <ds:schemaRef ds:uri="http://schemas.microsoft.com/office/2006/metadata/properties"/>
-    <ds:schemaRef ds:uri="http://schemas.microsoft.com/office/infopath/2007/PartnerControls"/>
-    <ds:schemaRef ds:uri="http://schemas.openxmlformats.org/package/2006/metadata/core-properties"/>
-    <ds:schemaRef ds:uri="http://www.w3.org/XML/1998/namespace"/>
-  </ds:schemaRefs>
-</ds:datastoreItem>
-</file>
-
 <file path=customXml/itemProps3.xml><?xml version="1.0" encoding="utf-8"?>
 <ds:datastoreItem xmlns:ds="http://schemas.openxmlformats.org/officeDocument/2006/customXml" ds:itemID="{EF0BFC65-ABD5-40EA-BAE0-821B9D6524E8}">
   <ds:schemaRefs>

</xml_diff>

<commit_message>
set up cisnet 2025
</commit_message>
<xml_diff>
--- a/master_files/materials/03_Sampling.pptx
+++ b/master_files/materials/03_Sampling.pptx
@@ -5,7 +5,7 @@
     <p:sldMasterId id="2147483648" r:id="rId4"/>
   </p:sldMasterIdLst>
   <p:notesMasterIdLst>
-    <p:notesMasterId r:id="rId32"/>
+    <p:notesMasterId r:id="rId33"/>
   </p:notesMasterIdLst>
   <p:sldIdLst>
     <p:sldId id="1100" r:id="rId5"/>
@@ -33,8 +33,9 @@
     <p:sldId id="1097" r:id="rId27"/>
     <p:sldId id="1107" r:id="rId28"/>
     <p:sldId id="1109" r:id="rId29"/>
-    <p:sldId id="1079" r:id="rId30"/>
-    <p:sldId id="1101" r:id="rId31"/>
+    <p:sldId id="1110" r:id="rId30"/>
+    <p:sldId id="1079" r:id="rId31"/>
+    <p:sldId id="1101" r:id="rId32"/>
   </p:sldIdLst>
   <p:sldSz cx="12192000" cy="6858000"/>
   <p:notesSz cx="6858000" cy="9144000"/>
@@ -234,7 +235,7 @@
           <a:p>
             <a:fld id="{E033252C-ECEF-0044-BF19-FBFB46CE84A2}" type="datetimeFigureOut">
               <a:rPr lang="en-US" smtClean="0"/>
-              <a:t>12/16/24</a:t>
+              <a:t>3/27/25</a:t>
             </a:fld>
             <a:endParaRPr lang="en-US"/>
           </a:p>
@@ -732,7 +733,7 @@
           <a:p>
             <a:fld id="{6A8FB48A-BFC4-2846-8228-6201ABA4D0C5}" type="datetimeFigureOut">
               <a:rPr lang="en-US" smtClean="0"/>
-              <a:t>12/16/24</a:t>
+              <a:t>3/27/25</a:t>
             </a:fld>
             <a:endParaRPr lang="en-US"/>
           </a:p>
@@ -930,7 +931,7 @@
           <a:p>
             <a:fld id="{6A8FB48A-BFC4-2846-8228-6201ABA4D0C5}" type="datetimeFigureOut">
               <a:rPr lang="en-US" smtClean="0"/>
-              <a:t>12/16/24</a:t>
+              <a:t>3/27/25</a:t>
             </a:fld>
             <a:endParaRPr lang="en-US"/>
           </a:p>
@@ -1138,7 +1139,7 @@
           <a:p>
             <a:fld id="{6A8FB48A-BFC4-2846-8228-6201ABA4D0C5}" type="datetimeFigureOut">
               <a:rPr lang="en-US" smtClean="0"/>
-              <a:t>12/16/24</a:t>
+              <a:t>3/27/25</a:t>
             </a:fld>
             <a:endParaRPr lang="en-US"/>
           </a:p>
@@ -1336,7 +1337,7 @@
           <a:p>
             <a:fld id="{6A8FB48A-BFC4-2846-8228-6201ABA4D0C5}" type="datetimeFigureOut">
               <a:rPr lang="en-US" smtClean="0"/>
-              <a:t>12/16/24</a:t>
+              <a:t>3/27/25</a:t>
             </a:fld>
             <a:endParaRPr lang="en-US"/>
           </a:p>
@@ -1611,7 +1612,7 @@
           <a:p>
             <a:fld id="{6A8FB48A-BFC4-2846-8228-6201ABA4D0C5}" type="datetimeFigureOut">
               <a:rPr lang="en-US" smtClean="0"/>
-              <a:t>12/16/24</a:t>
+              <a:t>3/27/25</a:t>
             </a:fld>
             <a:endParaRPr lang="en-US"/>
           </a:p>
@@ -1876,7 +1877,7 @@
           <a:p>
             <a:fld id="{6A8FB48A-BFC4-2846-8228-6201ABA4D0C5}" type="datetimeFigureOut">
               <a:rPr lang="en-US" smtClean="0"/>
-              <a:t>12/16/24</a:t>
+              <a:t>3/27/25</a:t>
             </a:fld>
             <a:endParaRPr lang="en-US"/>
           </a:p>
@@ -2288,7 +2289,7 @@
           <a:p>
             <a:fld id="{6A8FB48A-BFC4-2846-8228-6201ABA4D0C5}" type="datetimeFigureOut">
               <a:rPr lang="en-US" smtClean="0"/>
-              <a:t>12/16/24</a:t>
+              <a:t>3/27/25</a:t>
             </a:fld>
             <a:endParaRPr lang="en-US"/>
           </a:p>
@@ -2429,7 +2430,7 @@
           <a:p>
             <a:fld id="{6A8FB48A-BFC4-2846-8228-6201ABA4D0C5}" type="datetimeFigureOut">
               <a:rPr lang="en-US" smtClean="0"/>
-              <a:t>12/16/24</a:t>
+              <a:t>3/27/25</a:t>
             </a:fld>
             <a:endParaRPr lang="en-US"/>
           </a:p>
@@ -2542,7 +2543,7 @@
           <a:p>
             <a:fld id="{6A8FB48A-BFC4-2846-8228-6201ABA4D0C5}" type="datetimeFigureOut">
               <a:rPr lang="en-US" smtClean="0"/>
-              <a:t>12/16/24</a:t>
+              <a:t>3/27/25</a:t>
             </a:fld>
             <a:endParaRPr lang="en-US"/>
           </a:p>
@@ -2853,7 +2854,7 @@
           <a:p>
             <a:fld id="{6A8FB48A-BFC4-2846-8228-6201ABA4D0C5}" type="datetimeFigureOut">
               <a:rPr lang="en-US" smtClean="0"/>
-              <a:t>12/16/24</a:t>
+              <a:t>3/27/25</a:t>
             </a:fld>
             <a:endParaRPr lang="en-US"/>
           </a:p>
@@ -3141,7 +3142,7 @@
           <a:p>
             <a:fld id="{6A8FB48A-BFC4-2846-8228-6201ABA4D0C5}" type="datetimeFigureOut">
               <a:rPr lang="en-US" smtClean="0"/>
-              <a:t>12/16/24</a:t>
+              <a:t>3/27/25</a:t>
             </a:fld>
             <a:endParaRPr lang="en-US"/>
           </a:p>
@@ -3382,7 +3383,7 @@
           <a:p>
             <a:fld id="{6A8FB48A-BFC4-2846-8228-6201ABA4D0C5}" type="datetimeFigureOut">
               <a:rPr lang="en-US" smtClean="0"/>
-              <a:t>12/16/24</a:t>
+              <a:t>3/27/25</a:t>
             </a:fld>
             <a:endParaRPr lang="en-US"/>
           </a:p>
@@ -14252,7 +14253,7 @@
 </file>
 
 <file path=ppt/slides/slide25.xml><?xml version="1.0" encoding="utf-8"?>
-<p:sld xmlns:a="http://schemas.openxmlformats.org/drawingml/2006/main" xmlns:r="http://schemas.openxmlformats.org/officeDocument/2006/relationships" xmlns:p="http://schemas.openxmlformats.org/presentationml/2006/main">
+<p:sld xmlns:a="http://schemas.openxmlformats.org/drawingml/2006/main" xmlns:r="http://schemas.openxmlformats.org/officeDocument/2006/relationships" xmlns:p="http://schemas.openxmlformats.org/presentationml/2006/main" show="0">
   <p:cSld>
     <p:spTree>
       <p:nvGrpSpPr>
@@ -14499,6 +14500,195 @@
   <p:cSld>
     <p:spTree>
       <p:nvGrpSpPr>
+        <p:cNvPr id="1" name="">
+          <a:extLst>
+            <a:ext uri="{FF2B5EF4-FFF2-40B4-BE49-F238E27FC236}">
+              <a16:creationId xmlns:a16="http://schemas.microsoft.com/office/drawing/2014/main" id="{9968307E-B792-995C-CDCB-F782E4DFA887}"/>
+            </a:ext>
+          </a:extLst>
+        </p:cNvPr>
+        <p:cNvGrpSpPr/>
+        <p:nvPr/>
+      </p:nvGrpSpPr>
+      <p:grpSpPr>
+        <a:xfrm>
+          <a:off x="0" y="0"/>
+          <a:ext cx="0" cy="0"/>
+          <a:chOff x="0" y="0"/>
+          <a:chExt cx="0" cy="0"/>
+        </a:xfrm>
+      </p:grpSpPr>
+      <p:sp>
+        <p:nvSpPr>
+          <p:cNvPr id="14" name="Title 13">
+            <a:extLst>
+              <a:ext uri="{FF2B5EF4-FFF2-40B4-BE49-F238E27FC236}">
+                <a16:creationId xmlns:a16="http://schemas.microsoft.com/office/drawing/2014/main" id="{EE7D49B8-9AB2-2D19-BD5F-B18740F08D3A}"/>
+              </a:ext>
+            </a:extLst>
+          </p:cNvPr>
+          <p:cNvSpPr>
+            <a:spLocks noGrp="1"/>
+          </p:cNvSpPr>
+          <p:nvPr>
+            <p:ph type="title"/>
+          </p:nvPr>
+        </p:nvSpPr>
+        <p:spPr>
+          <a:xfrm>
+            <a:off x="838200" y="552954"/>
+            <a:ext cx="10515600" cy="765544"/>
+          </a:xfrm>
+        </p:spPr>
+        <p:txBody>
+          <a:bodyPr/>
+          <a:lstStyle/>
+          <a:p>
+            <a:r>
+              <a:rPr lang="en-US" dirty="0"/>
+              <a:t>More in these works…</a:t>
+            </a:r>
+          </a:p>
+        </p:txBody>
+      </p:sp>
+      <p:pic>
+        <p:nvPicPr>
+          <p:cNvPr id="2" name="Picture 1">
+            <a:extLst>
+              <a:ext uri="{FF2B5EF4-FFF2-40B4-BE49-F238E27FC236}">
+                <a16:creationId xmlns:a16="http://schemas.microsoft.com/office/drawing/2014/main" id="{10AB61F1-7043-051B-3975-588E9EFA0395}"/>
+              </a:ext>
+            </a:extLst>
+          </p:cNvPr>
+          <p:cNvPicPr>
+            <a:picLocks noChangeAspect="1"/>
+          </p:cNvPicPr>
+          <p:nvPr/>
+        </p:nvPicPr>
+        <p:blipFill>
+          <a:blip r:embed="rId2"/>
+          <a:stretch>
+            <a:fillRect/>
+          </a:stretch>
+        </p:blipFill>
+        <p:spPr>
+          <a:xfrm>
+            <a:off x="624636" y="1673269"/>
+            <a:ext cx="5689956" cy="1595092"/>
+          </a:xfrm>
+          <a:prstGeom prst="rect">
+            <a:avLst/>
+          </a:prstGeom>
+        </p:spPr>
+      </p:pic>
+      <p:pic>
+        <p:nvPicPr>
+          <p:cNvPr id="4" name="Picture 3" descr="Qr code&#10;&#10;Description automatically generated">
+            <a:extLst>
+              <a:ext uri="{FF2B5EF4-FFF2-40B4-BE49-F238E27FC236}">
+                <a16:creationId xmlns:a16="http://schemas.microsoft.com/office/drawing/2014/main" id="{5F90826D-30B5-3C47-B715-462713A5C928}"/>
+              </a:ext>
+            </a:extLst>
+          </p:cNvPr>
+          <p:cNvPicPr>
+            <a:picLocks noChangeAspect="1"/>
+          </p:cNvPicPr>
+          <p:nvPr/>
+        </p:nvPicPr>
+        <p:blipFill>
+          <a:blip r:embed="rId3"/>
+          <a:stretch>
+            <a:fillRect/>
+          </a:stretch>
+        </p:blipFill>
+        <p:spPr>
+          <a:xfrm>
+            <a:off x="7871660" y="1179857"/>
+            <a:ext cx="2632487" cy="2632487"/>
+          </a:xfrm>
+          <a:prstGeom prst="rect">
+            <a:avLst/>
+          </a:prstGeom>
+        </p:spPr>
+      </p:pic>
+      <p:pic>
+        <p:nvPicPr>
+          <p:cNvPr id="3" name="Picture 2">
+            <a:extLst>
+              <a:ext uri="{FF2B5EF4-FFF2-40B4-BE49-F238E27FC236}">
+                <a16:creationId xmlns:a16="http://schemas.microsoft.com/office/drawing/2014/main" id="{4FFBAAD9-C9C7-2DBD-678B-CCF9509EDDEC}"/>
+              </a:ext>
+            </a:extLst>
+          </p:cNvPr>
+          <p:cNvPicPr>
+            <a:picLocks noChangeAspect="1"/>
+          </p:cNvPicPr>
+          <p:nvPr/>
+        </p:nvPicPr>
+        <p:blipFill>
+          <a:blip r:embed="rId4"/>
+          <a:stretch>
+            <a:fillRect/>
+          </a:stretch>
+        </p:blipFill>
+        <p:spPr>
+          <a:xfrm>
+            <a:off x="624635" y="4129474"/>
+            <a:ext cx="5689955" cy="2151885"/>
+          </a:xfrm>
+          <a:prstGeom prst="rect">
+            <a:avLst/>
+          </a:prstGeom>
+        </p:spPr>
+      </p:pic>
+      <p:pic>
+        <p:nvPicPr>
+          <p:cNvPr id="6" name="Picture 5">
+            <a:extLst>
+              <a:ext uri="{FF2B5EF4-FFF2-40B4-BE49-F238E27FC236}">
+                <a16:creationId xmlns:a16="http://schemas.microsoft.com/office/drawing/2014/main" id="{83A8CFB8-5962-3FAC-B094-A3120269E621}"/>
+              </a:ext>
+            </a:extLst>
+          </p:cNvPr>
+          <p:cNvPicPr>
+            <a:picLocks noChangeAspect="1"/>
+          </p:cNvPicPr>
+          <p:nvPr/>
+        </p:nvPicPr>
+        <p:blipFill>
+          <a:blip r:embed="rId5"/>
+          <a:stretch>
+            <a:fillRect/>
+          </a:stretch>
+        </p:blipFill>
+        <p:spPr>
+          <a:xfrm>
+            <a:off x="7908731" y="4129474"/>
+            <a:ext cx="2520870" cy="2454531"/>
+          </a:xfrm>
+          <a:prstGeom prst="rect">
+            <a:avLst/>
+          </a:prstGeom>
+        </p:spPr>
+      </p:pic>
+    </p:spTree>
+    <p:extLst>
+      <p:ext uri="{BB962C8B-B14F-4D97-AF65-F5344CB8AC3E}">
+        <p14:creationId xmlns:p14="http://schemas.microsoft.com/office/powerpoint/2010/main" val="4151430150"/>
+      </p:ext>
+    </p:extLst>
+  </p:cSld>
+  <p:clrMapOvr>
+    <a:masterClrMapping/>
+  </p:clrMapOvr>
+</p:sld>
+</file>
+
+<file path=ppt/slides/slide27.xml><?xml version="1.0" encoding="utf-8"?>
+<p:sld xmlns:a="http://schemas.openxmlformats.org/drawingml/2006/main" xmlns:r="http://schemas.openxmlformats.org/officeDocument/2006/relationships" xmlns:p="http://schemas.openxmlformats.org/presentationml/2006/main">
+  <p:cSld>
+    <p:spTree>
+      <p:nvGrpSpPr>
         <p:cNvPr id="1" name=""/>
         <p:cNvGrpSpPr/>
         <p:nvPr/>
@@ -14552,7 +14742,7 @@
 </p:sld>
 </file>
 
-<file path=ppt/slides/slide27.xml><?xml version="1.0" encoding="utf-8"?>
+<file path=ppt/slides/slide28.xml><?xml version="1.0" encoding="utf-8"?>
 <p:sld xmlns:a="http://schemas.openxmlformats.org/drawingml/2006/main" xmlns:r="http://schemas.openxmlformats.org/officeDocument/2006/relationships" xmlns:p="http://schemas.openxmlformats.org/presentationml/2006/main">
   <p:cSld>
     <p:spTree>
@@ -19180,17 +19370,6 @@
 </file>
 
 <file path=customXml/item1.xml><?xml version="1.0" encoding="utf-8"?>
-<p:properties xmlns:p="http://schemas.microsoft.com/office/2006/metadata/properties" xmlns:xsi="http://www.w3.org/2001/XMLSchema-instance" xmlns:pc="http://schemas.microsoft.com/office/infopath/2007/PartnerControls">
-  <documentManagement>
-    <TaxCatchAll xmlns="b6c9d19c-b34a-4cf4-8ebf-64c63fc48083" xsi:nil="true"/>
-    <lcf76f155ced4ddcb4097134ff3c332f xmlns="33f92c16-e346-46b5-ac57-2b519ac4cf68">
-      <Terms xmlns="http://schemas.microsoft.com/office/infopath/2007/PartnerControls"/>
-    </lcf76f155ced4ddcb4097134ff3c332f>
-  </documentManagement>
-</p:properties>
-</file>
-
-<file path=customXml/item2.xml><?xml version="1.0" encoding="utf-8"?>
 <ct:contentTypeSchema xmlns:ct="http://schemas.microsoft.com/office/2006/metadata/contentType" xmlns:ma="http://schemas.microsoft.com/office/2006/metadata/properties/metaAttributes" ct:_="" ma:_="" ma:contentTypeName="Document" ma:contentTypeID="0x0101007069032936BB004A979B3FCE77DE1EB1" ma:contentTypeVersion="16" ma:contentTypeDescription="Create a new document." ma:contentTypeScope="" ma:versionID="59b39aa881a230c9f06045ed60478b88">
   <xsd:schema xmlns:xsd="http://www.w3.org/2001/XMLSchema" xmlns:xs="http://www.w3.org/2001/XMLSchema" xmlns:p="http://schemas.microsoft.com/office/2006/metadata/properties" xmlns:ns2="33f92c16-e346-46b5-ac57-2b519ac4cf68" xmlns:ns3="0efde304-9646-43d8-8eee-5b1a55ab17f1" xmlns:ns4="b6c9d19c-b34a-4cf4-8ebf-64c63fc48083" targetNamespace="http://schemas.microsoft.com/office/2006/metadata/properties" ma:root="true" ma:fieldsID="c596c03b60b8e16cee14ab235af6374a" ns2:_="" ns3:_="" ns4:_="">
     <xsd:import namespace="33f92c16-e346-46b5-ac57-2b519ac4cf68"/>
@@ -19430,6 +19609,17 @@
 </ct:contentTypeSchema>
 </file>
 
+<file path=customXml/item2.xml><?xml version="1.0" encoding="utf-8"?>
+<p:properties xmlns:p="http://schemas.microsoft.com/office/2006/metadata/properties" xmlns:xsi="http://www.w3.org/2001/XMLSchema-instance" xmlns:pc="http://schemas.microsoft.com/office/infopath/2007/PartnerControls">
+  <documentManagement>
+    <TaxCatchAll xmlns="b6c9d19c-b34a-4cf4-8ebf-64c63fc48083" xsi:nil="true"/>
+    <lcf76f155ced4ddcb4097134ff3c332f xmlns="33f92c16-e346-46b5-ac57-2b519ac4cf68">
+      <Terms xmlns="http://schemas.microsoft.com/office/infopath/2007/PartnerControls"/>
+    </lcf76f155ced4ddcb4097134ff3c332f>
+  </documentManagement>
+</p:properties>
+</file>
+
 <file path=customXml/item3.xml><?xml version="1.0" encoding="utf-8"?>
 <?mso-contentType ?>
 <FormTemplates xmlns="http://schemas.microsoft.com/sharepoint/v3/contenttype/forms">
@@ -19440,24 +19630,6 @@
 </file>
 
 <file path=customXml/itemProps1.xml><?xml version="1.0" encoding="utf-8"?>
-<ds:datastoreItem xmlns:ds="http://schemas.openxmlformats.org/officeDocument/2006/customXml" ds:itemID="{E709C047-1DE0-4980-A90A-4D5EFC165D2C}">
-  <ds:schemaRefs>
-    <ds:schemaRef ds:uri="0efde304-9646-43d8-8eee-5b1a55ab17f1"/>
-    <ds:schemaRef ds:uri="33f92c16-e346-46b5-ac57-2b519ac4cf68"/>
-    <ds:schemaRef ds:uri="b6c9d19c-b34a-4cf4-8ebf-64c63fc48083"/>
-    <ds:schemaRef ds:uri="http://purl.org/dc/dcmitype/"/>
-    <ds:schemaRef ds:uri="http://purl.org/dc/elements/1.1/"/>
-    <ds:schemaRef ds:uri="http://purl.org/dc/terms/"/>
-    <ds:schemaRef ds:uri="http://schemas.microsoft.com/office/2006/documentManagement/types"/>
-    <ds:schemaRef ds:uri="http://schemas.microsoft.com/office/2006/metadata/properties"/>
-    <ds:schemaRef ds:uri="http://schemas.microsoft.com/office/infopath/2007/PartnerControls"/>
-    <ds:schemaRef ds:uri="http://schemas.openxmlformats.org/package/2006/metadata/core-properties"/>
-    <ds:schemaRef ds:uri="http://www.w3.org/XML/1998/namespace"/>
-  </ds:schemaRefs>
-</ds:datastoreItem>
-</file>
-
-<file path=customXml/itemProps2.xml><?xml version="1.0" encoding="utf-8"?>
 <ds:datastoreItem xmlns:ds="http://schemas.openxmlformats.org/officeDocument/2006/customXml" ds:itemID="{2D7DA705-6300-4113-B183-485198D9C84E}">
   <ds:schemaRefs>
     <ds:schemaRef ds:uri="0efde304-9646-43d8-8eee-5b1a55ab17f1"/>
@@ -19477,6 +19649,24 @@
 </ds:datastoreItem>
 </file>
 
+<file path=customXml/itemProps2.xml><?xml version="1.0" encoding="utf-8"?>
+<ds:datastoreItem xmlns:ds="http://schemas.openxmlformats.org/officeDocument/2006/customXml" ds:itemID="{E709C047-1DE0-4980-A90A-4D5EFC165D2C}">
+  <ds:schemaRefs>
+    <ds:schemaRef ds:uri="0efde304-9646-43d8-8eee-5b1a55ab17f1"/>
+    <ds:schemaRef ds:uri="33f92c16-e346-46b5-ac57-2b519ac4cf68"/>
+    <ds:schemaRef ds:uri="b6c9d19c-b34a-4cf4-8ebf-64c63fc48083"/>
+    <ds:schemaRef ds:uri="http://purl.org/dc/dcmitype/"/>
+    <ds:schemaRef ds:uri="http://purl.org/dc/elements/1.1/"/>
+    <ds:schemaRef ds:uri="http://purl.org/dc/terms/"/>
+    <ds:schemaRef ds:uri="http://schemas.microsoft.com/office/2006/documentManagement/types"/>
+    <ds:schemaRef ds:uri="http://schemas.microsoft.com/office/2006/metadata/properties"/>
+    <ds:schemaRef ds:uri="http://schemas.microsoft.com/office/infopath/2007/PartnerControls"/>
+    <ds:schemaRef ds:uri="http://schemas.openxmlformats.org/package/2006/metadata/core-properties"/>
+    <ds:schemaRef ds:uri="http://www.w3.org/XML/1998/namespace"/>
+  </ds:schemaRefs>
+</ds:datastoreItem>
+</file>
+
 <file path=customXml/itemProps3.xml><?xml version="1.0" encoding="utf-8"?>
 <ds:datastoreItem xmlns:ds="http://schemas.openxmlformats.org/officeDocument/2006/customXml" ds:itemID="{EF0BFC65-ABD5-40EA-BAE0-821B9D6524E8}">
   <ds:schemaRefs>

</xml_diff>